<commit_message>
begin transcript for meeting notes
</commit_message>
<xml_diff>
--- a/Section_3_Mgmt_Informed/Week8_Presentation/BachmeierNTIM7101-8.pptx
+++ b/Section_3_Mgmt_Informed/Week8_Presentation/BachmeierNTIM7101-8.pptx
@@ -5029,7 +5029,7 @@
           </a:pPr>
           <a:r>
             <a:rPr lang="en-US" dirty="0"/>
-            <a:t>Analysis</a:t>
+            <a:t>Data Analysis</a:t>
           </a:r>
         </a:p>
       </dgm:t>
@@ -5070,8 +5070,8 @@
             <a:defRPr b="1"/>
           </a:pPr>
           <a:r>
-            <a:rPr lang="en-US"/>
-            <a:t>Apply</a:t>
+            <a:rPr lang="en-US" dirty="0"/>
+            <a:t>Deliver</a:t>
           </a:r>
         </a:p>
       </dgm:t>
@@ -5112,7 +5112,7 @@
           </a:pPr>
           <a:r>
             <a:rPr lang="en-US" dirty="0"/>
-            <a:t>Evaluate Strategize</a:t>
+            <a:t>Implementation</a:t>
           </a:r>
         </a:p>
       </dgm:t>
@@ -5194,7 +5194,7 @@
           </a:pPr>
           <a:r>
             <a:rPr lang="en-US" dirty="0"/>
-            <a:t>Problem</a:t>
+            <a:t>Problem Statement</a:t>
           </a:r>
         </a:p>
       </dgm:t>
@@ -5276,7 +5276,7 @@
           </a:pPr>
           <a:r>
             <a:rPr lang="en-US" dirty="0"/>
-            <a:t>Interfere</a:t>
+            <a:t>Output Inference</a:t>
           </a:r>
         </a:p>
       </dgm:t>
@@ -5317,7 +5317,7 @@
           </a:pPr>
           <a:r>
             <a:rPr lang="en-US" dirty="0"/>
-            <a:t>Limitations</a:t>
+            <a:t>Research Limitations</a:t>
           </a:r>
         </a:p>
       </dgm:t>
@@ -5358,7 +5358,7 @@
           </a:pPr>
           <a:r>
             <a:rPr lang="en-US" dirty="0"/>
-            <a:t>Monitor Progress</a:t>
+            <a:t>Monitoring Progress</a:t>
           </a:r>
         </a:p>
       </dgm:t>
@@ -5495,7 +5495,7 @@
           </a:pPr>
           <a:r>
             <a:rPr lang="en-US" dirty="0"/>
-            <a:t>Data</a:t>
+            <a:t>Data Requirements</a:t>
           </a:r>
         </a:p>
       </dgm:t>
@@ -8430,7 +8430,7 @@
           </a:pPr>
           <a:r>
             <a:rPr lang="en-US" sz="1600" kern="1200" dirty="0"/>
-            <a:t>Problem</a:t>
+            <a:t>Problem Statement</a:t>
           </a:r>
         </a:p>
         <a:p>
@@ -8448,7 +8448,7 @@
           </a:pPr>
           <a:r>
             <a:rPr lang="en-US" sz="1600" kern="1200" dirty="0"/>
-            <a:t>Data</a:t>
+            <a:t>Data Requirements</a:t>
           </a:r>
         </a:p>
         <a:p>
@@ -8654,7 +8654,7 @@
           </a:pPr>
           <a:r>
             <a:rPr lang="en-US" sz="1600" kern="1200" dirty="0"/>
-            <a:t>Analysis</a:t>
+            <a:t>Data Analysis</a:t>
           </a:r>
         </a:p>
         <a:p>
@@ -8672,7 +8672,7 @@
           </a:pPr>
           <a:r>
             <a:rPr lang="en-US" sz="1600" kern="1200" dirty="0"/>
-            <a:t>Interfere</a:t>
+            <a:t>Output Inference</a:t>
           </a:r>
         </a:p>
         <a:p>
@@ -8690,7 +8690,7 @@
           </a:pPr>
           <a:r>
             <a:rPr lang="en-US" sz="1600" kern="1200" dirty="0"/>
-            <a:t>Limitations</a:t>
+            <a:t>Research Limitations</a:t>
           </a:r>
         </a:p>
       </dsp:txBody>
@@ -8799,8 +8799,8 @@
             <a:defRPr b="1"/>
           </a:pPr>
           <a:r>
-            <a:rPr lang="en-US" sz="2100" kern="1200"/>
-            <a:t>Apply</a:t>
+            <a:rPr lang="en-US" sz="2100" kern="1200" dirty="0"/>
+            <a:t>Deliver</a:t>
           </a:r>
         </a:p>
       </dsp:txBody>
@@ -8860,7 +8860,7 @@
           </a:pPr>
           <a:r>
             <a:rPr lang="en-US" sz="1600" kern="1200" dirty="0"/>
-            <a:t>Evaluate Strategize</a:t>
+            <a:t>Implementation</a:t>
           </a:r>
         </a:p>
         <a:p>
@@ -8878,7 +8878,7 @@
           </a:pPr>
           <a:r>
             <a:rPr lang="en-US" sz="1600" kern="1200" dirty="0"/>
-            <a:t>Monitor Progress</a:t>
+            <a:t>Monitoring Progress</a:t>
           </a:r>
         </a:p>
       </dsp:txBody>
@@ -21442,6 +21442,33 @@
           <a:bodyPr/>
           <a:lstStyle/>
           <a:p>
+            <a:pPr marL="0" marR="0" lvl="0" indent="0" algn="l" defTabSz="914400" rtl="0" eaLnBrk="1" fontAlgn="auto" latinLnBrk="0" hangingPunct="1">
+              <a:lnSpc>
+                <a:spcPct val="100000"/>
+              </a:lnSpc>
+              <a:spcBef>
+                <a:spcPts val="0"/>
+              </a:spcBef>
+              <a:spcAft>
+                <a:spcPts val="0"/>
+              </a:spcAft>
+              <a:buClrTx/>
+              <a:buSzTx/>
+              <a:buFontTx/>
+              <a:buNone/>
+              <a:tabLst/>
+              <a:defRPr/>
+            </a:pPr>
+            <a:r>
+              <a:rPr lang="en-US" sz="1800" dirty="0">
+                <a:effectLst/>
+                <a:latin typeface="Times New Roman" panose="02020603050405020304" pitchFamily="18" charset="0"/>
+                <a:ea typeface="Calibri" panose="020F0502020204030204" pitchFamily="34" charset="0"/>
+              </a:rPr>
+              <a:t>Good afternoon, I am Nate Bachmeier.  Today I will be reviewing the project proposal for NCU-Cares (NCU-C) next initiative, reducing police violence in America.  This presentation embodies eight long weekends of looking at this problem from a unique perspective.</a:t>
+            </a:r>
+          </a:p>
+          <a:p>
             <a:endParaRPr lang="en-US" dirty="0"/>
           </a:p>
         </p:txBody>
@@ -21526,51 +21553,25 @@
           <a:bodyPr/>
           <a:lstStyle/>
           <a:p>
+            <a:pPr marL="0" marR="0">
+              <a:lnSpc>
+                <a:spcPct val="200000"/>
+              </a:lnSpc>
+              <a:spcBef>
+                <a:spcPts val="0"/>
+              </a:spcBef>
+              <a:spcAft>
+                <a:spcPts val="0"/>
+              </a:spcAft>
+            </a:pPr>
             <a:r>
-              <a:rPr lang="en-US" dirty="0"/>
-              <a:t>Understanding Police Violence</a:t>
+              <a:rPr lang="en-US" sz="1800" dirty="0">
+                <a:effectLst/>
+                <a:latin typeface="Times New Roman" panose="02020603050405020304" pitchFamily="18" charset="0"/>
+                <a:ea typeface="Calibri" panose="020F0502020204030204" pitchFamily="34" charset="0"/>
+              </a:rPr>
+              <a:t>The agenda for this discussion will cover the planning, evaluation, and delivery of an effective strategy to address this issue.  Then we will conclude with reflections into learnings, future topics, and conclusions.  Each of these sections will further drill into a collection of relevant subtopics.</a:t>
             </a:r>
-          </a:p>
-          <a:p>
-            <a:pPr lvl="1"/>
-            <a:r>
-              <a:rPr lang="en-US" dirty="0"/>
-              <a:t>Scoping the problem</a:t>
-            </a:r>
-          </a:p>
-          <a:p>
-            <a:pPr lvl="1"/>
-            <a:r>
-              <a:rPr lang="en-US" dirty="0"/>
-              <a:t>Identify research methodology</a:t>
-            </a:r>
-          </a:p>
-          <a:p>
-            <a:pPr lvl="1"/>
-            <a:r>
-              <a:rPr lang="en-US" dirty="0"/>
-              <a:t>Analyze available data</a:t>
-            </a:r>
-          </a:p>
-          <a:p>
-            <a:pPr lvl="1"/>
-            <a:r>
-              <a:rPr lang="en-US" dirty="0"/>
-              <a:t>Interpret the Results</a:t>
-            </a:r>
-          </a:p>
-          <a:p>
-            <a:pPr lvl="1"/>
-            <a:r>
-              <a:rPr lang="en-US" dirty="0"/>
-              <a:t>Evaluate next steps</a:t>
-            </a:r>
-          </a:p>
-          <a:p>
-            <a:endParaRPr lang="en-US" dirty="0"/>
-          </a:p>
-          <a:p>
-            <a:endParaRPr lang="en-US" dirty="0"/>
           </a:p>
         </p:txBody>
       </p:sp>
@@ -32248,7 +32249,7 @@
                   <a:srgbClr val="FEFFFF"/>
                 </a:solidFill>
               </a:rPr>
-              <a:t>Applying</a:t>
+              <a:t>Strategy Delivery</a:t>
             </a:r>
           </a:p>
         </p:txBody>
@@ -32290,7 +32291,7 @@
                   </a:schemeClr>
                 </a:solidFill>
               </a:rPr>
-              <a:t>Evaluate Strategy</a:t>
+              <a:t>Strategy Implementation</a:t>
             </a:r>
             <a:br>
               <a:rPr lang="en-US" dirty="0">
@@ -32595,7 +32596,7 @@
           <a:p>
             <a:r>
               <a:rPr lang="en-US" dirty="0"/>
-              <a:t>Evaluate Strategy</a:t>
+              <a:t>Implementing Plan</a:t>
             </a:r>
           </a:p>
         </p:txBody>
@@ -33176,8 +33177,12 @@
           <a:lstStyle/>
           <a:p>
             <a:r>
+              <a:rPr lang="en-US"/>
+              <a:t>Monitoring </a:t>
+            </a:r>
+            <a:r>
               <a:rPr lang="en-US" dirty="0"/>
-              <a:t>Monitor Progress</a:t>
+              <a:t>Progress</a:t>
             </a:r>
           </a:p>
         </p:txBody>
@@ -34844,7 +34849,7 @@
             <p:ph idx="1"/>
             <p:extLst>
               <p:ext uri="{D42A27DB-BD31-4B8C-83A1-F6EECF244321}">
-                <p14:modId xmlns:p14="http://schemas.microsoft.com/office/powerpoint/2010/main" val="791933476"/>
+                <p14:modId xmlns:p14="http://schemas.microsoft.com/office/powerpoint/2010/main" val="4204812506"/>
               </p:ext>
             </p:extLst>
           </p:nvPr>
@@ -40782,7 +40787,7 @@
                   </a:schemeClr>
                 </a:solidFill>
               </a:rPr>
-              <a:t>Limitation Identification</a:t>
+              <a:t>Research Limitations</a:t>
             </a:r>
           </a:p>
         </p:txBody>

</xml_diff>

<commit_message>
add a few more slides
</commit_message>
<xml_diff>
--- a/Section_3_Mgmt_Informed/Week8_Presentation/BachmeierNTIM7101-8.pptx
+++ b/Section_3_Mgmt_Informed/Week8_Presentation/BachmeierNTIM7101-8.pptx
@@ -22027,6 +22027,90 @@
           <a:bodyPr/>
           <a:lstStyle/>
           <a:p>
+            <a:endParaRPr lang="en-US"/>
+          </a:p>
+        </p:txBody>
+      </p:sp>
+      <p:sp>
+        <p:nvSpPr>
+          <p:cNvPr id="4" name="Slide Number Placeholder 3"/>
+          <p:cNvSpPr>
+            <a:spLocks noGrp="1"/>
+          </p:cNvSpPr>
+          <p:nvPr>
+            <p:ph type="sldNum" sz="quarter" idx="5"/>
+          </p:nvPr>
+        </p:nvSpPr>
+        <p:spPr/>
+        <p:txBody>
+          <a:bodyPr/>
+          <a:lstStyle/>
+          <a:p>
+            <a:fld id="{0B4881D8-6EFA-4719-AD95-0B89AAC3F54C}" type="slidenum">
+              <a:rPr lang="en-US" smtClean="0"/>
+              <a:t>10</a:t>
+            </a:fld>
+            <a:endParaRPr lang="en-US"/>
+          </a:p>
+        </p:txBody>
+      </p:sp>
+    </p:spTree>
+    <p:extLst>
+      <p:ext uri="{BB962C8B-B14F-4D97-AF65-F5344CB8AC3E}">
+        <p14:creationId xmlns:p14="http://schemas.microsoft.com/office/powerpoint/2010/main" val="2393936190"/>
+      </p:ext>
+    </p:extLst>
+  </p:cSld>
+  <p:clrMapOvr>
+    <a:masterClrMapping/>
+  </p:clrMapOvr>
+</p:notes>
+</file>
+
+<file path=ppt/notesSlides/notesSlide5.xml><?xml version="1.0" encoding="utf-8"?>
+<p:notes xmlns:a="http://schemas.openxmlformats.org/drawingml/2006/main" xmlns:r="http://schemas.openxmlformats.org/officeDocument/2006/relationships" xmlns:p="http://schemas.openxmlformats.org/presentationml/2006/main">
+  <p:cSld>
+    <p:spTree>
+      <p:nvGrpSpPr>
+        <p:cNvPr id="1" name=""/>
+        <p:cNvGrpSpPr/>
+        <p:nvPr/>
+      </p:nvGrpSpPr>
+      <p:grpSpPr>
+        <a:xfrm>
+          <a:off x="0" y="0"/>
+          <a:ext cx="0" cy="0"/>
+          <a:chOff x="0" y="0"/>
+          <a:chExt cx="0" cy="0"/>
+        </a:xfrm>
+      </p:grpSpPr>
+      <p:sp>
+        <p:nvSpPr>
+          <p:cNvPr id="2" name="Slide Image Placeholder 1"/>
+          <p:cNvSpPr>
+            <a:spLocks noGrp="1" noRot="1" noChangeAspect="1"/>
+          </p:cNvSpPr>
+          <p:nvPr>
+            <p:ph type="sldImg"/>
+          </p:nvPr>
+        </p:nvSpPr>
+        <p:spPr/>
+      </p:sp>
+      <p:sp>
+        <p:nvSpPr>
+          <p:cNvPr id="3" name="Notes Placeholder 2"/>
+          <p:cNvSpPr>
+            <a:spLocks noGrp="1"/>
+          </p:cNvSpPr>
+          <p:nvPr>
+            <p:ph type="body" idx="1"/>
+          </p:nvPr>
+        </p:nvSpPr>
+        <p:spPr/>
+        <p:txBody>
+          <a:bodyPr/>
+          <a:lstStyle/>
+          <a:p>
             <a:endParaRPr lang="en-US" dirty="0"/>
           </a:p>
         </p:txBody>
@@ -22067,7 +22151,7 @@
 </p:notes>
 </file>
 
-<file path=ppt/notesSlides/notesSlide5.xml><?xml version="1.0" encoding="utf-8"?>
+<file path=ppt/notesSlides/notesSlide6.xml><?xml version="1.0" encoding="utf-8"?>
 <p:notes xmlns:a="http://schemas.openxmlformats.org/drawingml/2006/main" xmlns:r="http://schemas.openxmlformats.org/officeDocument/2006/relationships" xmlns:p="http://schemas.openxmlformats.org/presentationml/2006/main">
   <p:cSld>
     <p:spTree>
@@ -22151,7 +22235,7 @@
 </p:notes>
 </file>
 
-<file path=ppt/notesSlides/notesSlide6.xml><?xml version="1.0" encoding="utf-8"?>
+<file path=ppt/notesSlides/notesSlide7.xml><?xml version="1.0" encoding="utf-8"?>
 <p:notes xmlns:a="http://schemas.openxmlformats.org/drawingml/2006/main" xmlns:r="http://schemas.openxmlformats.org/officeDocument/2006/relationships" xmlns:p="http://schemas.openxmlformats.org/presentationml/2006/main">
   <p:cSld>
     <p:spTree>
@@ -22235,7 +22319,7 @@
 </p:notes>
 </file>
 
-<file path=ppt/notesSlides/notesSlide7.xml><?xml version="1.0" encoding="utf-8"?>
+<file path=ppt/notesSlides/notesSlide8.xml><?xml version="1.0" encoding="utf-8"?>
 <p:notes xmlns:a="http://schemas.openxmlformats.org/drawingml/2006/main" xmlns:r="http://schemas.openxmlformats.org/officeDocument/2006/relationships" xmlns:p="http://schemas.openxmlformats.org/presentationml/2006/main">
   <p:cSld>
     <p:spTree>
@@ -30861,7 +30945,44 @@
           <a:bodyPr/>
           <a:lstStyle/>
           <a:p>
+            <a:r>
+              <a:rPr lang="en-US" dirty="0"/>
+              <a:t>R1 does race or sanity explain data?</a:t>
+            </a:r>
+          </a:p>
+          <a:p>
+            <a:pPr lvl="1"/>
+            <a:r>
+              <a:rPr lang="en-US" dirty="0"/>
+              <a:t>No, the effect size is too small</a:t>
+            </a:r>
+            <a:br>
+              <a:rPr lang="en-US" dirty="0"/>
+            </a:br>
             <a:endParaRPr lang="en-US" dirty="0"/>
+          </a:p>
+          <a:p>
+            <a:r>
+              <a:rPr lang="en-US" dirty="0"/>
+              <a:t>R2 are these even-handed or racially profiled deaths?</a:t>
+            </a:r>
+          </a:p>
+          <a:p>
+            <a:pPr lvl="1"/>
+            <a:r>
+              <a:rPr lang="en-US" dirty="0"/>
+              <a:t>No, after demo. adj. populations are consistent</a:t>
+            </a:r>
+            <a:br>
+              <a:rPr lang="en-US" dirty="0"/>
+            </a:br>
+            <a:endParaRPr lang="en-US" dirty="0"/>
+          </a:p>
+          <a:p>
+            <a:r>
+              <a:rPr lang="en-US" dirty="0"/>
+              <a:t>R3 should we evaluate a different aspect? Yes!</a:t>
+            </a:r>
           </a:p>
         </p:txBody>
       </p:sp>
@@ -30880,7 +31001,7 @@
           <p:nvPr/>
         </p:nvPicPr>
         <p:blipFill>
-          <a:blip r:embed="rId2"/>
+          <a:blip r:embed="rId3"/>
           <a:stretch>
             <a:fillRect/>
           </a:stretch>
@@ -30910,7 +31031,7 @@
           <p:nvPr/>
         </p:nvPicPr>
         <p:blipFill>
-          <a:blip r:embed="rId3"/>
+          <a:blip r:embed="rId4"/>
           <a:stretch>
             <a:fillRect/>
           </a:stretch>

</xml_diff>